<commit_message>
Updated developer guide for search command.
</commit_message>
<xml_diff>
--- a/docs/diagrams/SearchCommandSequenceDiagram.pptx
+++ b/docs/diagrams/SearchCommandSequenceDiagram.pptx
@@ -4107,7 +4107,7 @@
         </p:nvCxnSpPr>
         <p:spPr>
           <a:xfrm flipV="1">
-            <a:off x="-3336781" y="4926206"/>
+            <a:off x="-3331961" y="5995016"/>
             <a:ext cx="1596514" cy="5378"/>
           </a:xfrm>
           <a:prstGeom prst="straightConnector1">
@@ -5332,22 +5332,22 @@
           <a:p>
             <a:pPr algn="ctr"/>
             <a:r>
-              <a:rPr lang="en-US" sz="1600">
+              <a:rPr lang="en-US" sz="1600" dirty="0">
                 <a:solidFill>
                   <a:schemeClr val="bg1"/>
                 </a:solidFill>
               </a:rPr>
-              <a:t>:Find</a:t>
+              <a:t>:Search</a:t>
             </a:r>
             <a:br>
-              <a:rPr lang="en-US" sz="1600">
+              <a:rPr lang="en-US" sz="1600" dirty="0">
                 <a:solidFill>
                   <a:schemeClr val="bg1"/>
                 </a:solidFill>
               </a:rPr>
             </a:br>
             <a:r>
-              <a:rPr lang="en-US" sz="1600">
+              <a:rPr lang="en-US" sz="1600" dirty="0">
                 <a:solidFill>
                   <a:schemeClr val="bg1"/>
                 </a:solidFill>

</xml_diff>

<commit_message>
Updated UG and DG
</commit_message>
<xml_diff>
--- a/docs/diagrams/SearchCommandSequenceDiagram.pptx
+++ b/docs/diagrams/SearchCommandSequenceDiagram.pptx
@@ -208,7 +208,7 @@
           <a:p>
             <a:fld id="{21B4A92B-49AE-402A-A902-897E65F183DA}" type="datetimeFigureOut">
               <a:rPr lang="zh-CN" altLang="en-US" smtClean="0"/>
-              <a:t>2019/4/11</a:t>
+              <a:t>2019/4/13</a:t>
             </a:fld>
             <a:endParaRPr lang="zh-CN" altLang="en-US"/>
           </a:p>
@@ -738,7 +738,7 @@
           <a:p>
             <a:fld id="{530820CF-B880-4189-942D-D702A7CBA730}" type="datetimeFigureOut">
               <a:rPr lang="zh-CN" altLang="en-US" smtClean="0"/>
-              <a:t>2019/4/11</a:t>
+              <a:t>2019/4/13</a:t>
             </a:fld>
             <a:endParaRPr lang="zh-CN" altLang="en-US"/>
           </a:p>
@@ -901,7 +901,7 @@
           <a:p>
             <a:fld id="{530820CF-B880-4189-942D-D702A7CBA730}" type="datetimeFigureOut">
               <a:rPr lang="zh-CN" altLang="en-US" smtClean="0"/>
-              <a:t>2019/4/11</a:t>
+              <a:t>2019/4/13</a:t>
             </a:fld>
             <a:endParaRPr lang="zh-CN" altLang="en-US"/>
           </a:p>
@@ -1074,7 +1074,7 @@
           <a:p>
             <a:fld id="{530820CF-B880-4189-942D-D702A7CBA730}" type="datetimeFigureOut">
               <a:rPr lang="zh-CN" altLang="en-US" smtClean="0"/>
-              <a:t>2019/4/11</a:t>
+              <a:t>2019/4/13</a:t>
             </a:fld>
             <a:endParaRPr lang="zh-CN" altLang="en-US"/>
           </a:p>
@@ -1237,7 +1237,7 @@
           <a:p>
             <a:fld id="{530820CF-B880-4189-942D-D702A7CBA730}" type="datetimeFigureOut">
               <a:rPr lang="zh-CN" altLang="en-US" smtClean="0"/>
-              <a:t>2019/4/11</a:t>
+              <a:t>2019/4/13</a:t>
             </a:fld>
             <a:endParaRPr lang="zh-CN" altLang="en-US"/>
           </a:p>
@@ -1477,7 +1477,7 @@
           <a:p>
             <a:fld id="{530820CF-B880-4189-942D-D702A7CBA730}" type="datetimeFigureOut">
               <a:rPr lang="zh-CN" altLang="en-US" smtClean="0"/>
-              <a:t>2019/4/11</a:t>
+              <a:t>2019/4/13</a:t>
             </a:fld>
             <a:endParaRPr lang="zh-CN" altLang="en-US"/>
           </a:p>
@@ -1757,7 +1757,7 @@
           <a:p>
             <a:fld id="{530820CF-B880-4189-942D-D702A7CBA730}" type="datetimeFigureOut">
               <a:rPr lang="zh-CN" altLang="en-US" smtClean="0"/>
-              <a:t>2019/4/11</a:t>
+              <a:t>2019/4/13</a:t>
             </a:fld>
             <a:endParaRPr lang="zh-CN" altLang="en-US"/>
           </a:p>
@@ -2171,7 +2171,7 @@
           <a:p>
             <a:fld id="{530820CF-B880-4189-942D-D702A7CBA730}" type="datetimeFigureOut">
               <a:rPr lang="zh-CN" altLang="en-US" smtClean="0"/>
-              <a:t>2019/4/11</a:t>
+              <a:t>2019/4/13</a:t>
             </a:fld>
             <a:endParaRPr lang="zh-CN" altLang="en-US"/>
           </a:p>
@@ -2283,7 +2283,7 @@
           <a:p>
             <a:fld id="{530820CF-B880-4189-942D-D702A7CBA730}" type="datetimeFigureOut">
               <a:rPr lang="zh-CN" altLang="en-US" smtClean="0"/>
-              <a:t>2019/4/11</a:t>
+              <a:t>2019/4/13</a:t>
             </a:fld>
             <a:endParaRPr lang="zh-CN" altLang="en-US"/>
           </a:p>
@@ -2373,7 +2373,7 @@
           <a:p>
             <a:fld id="{530820CF-B880-4189-942D-D702A7CBA730}" type="datetimeFigureOut">
               <a:rPr lang="zh-CN" altLang="en-US" smtClean="0"/>
-              <a:t>2019/4/11</a:t>
+              <a:t>2019/4/13</a:t>
             </a:fld>
             <a:endParaRPr lang="zh-CN" altLang="en-US"/>
           </a:p>
@@ -2643,7 +2643,7 @@
           <a:p>
             <a:fld id="{530820CF-B880-4189-942D-D702A7CBA730}" type="datetimeFigureOut">
               <a:rPr lang="zh-CN" altLang="en-US" smtClean="0"/>
-              <a:t>2019/4/11</a:t>
+              <a:t>2019/4/13</a:t>
             </a:fld>
             <a:endParaRPr lang="zh-CN" altLang="en-US"/>
           </a:p>
@@ -2890,7 +2890,7 @@
           <a:p>
             <a:fld id="{530820CF-B880-4189-942D-D702A7CBA730}" type="datetimeFigureOut">
               <a:rPr lang="zh-CN" altLang="en-US" smtClean="0"/>
-              <a:t>2019/4/11</a:t>
+              <a:t>2019/4/13</a:t>
             </a:fld>
             <a:endParaRPr lang="zh-CN" altLang="en-US"/>
           </a:p>
@@ -3096,7 +3096,7 @@
           <a:p>
             <a:fld id="{530820CF-B880-4189-942D-D702A7CBA730}" type="datetimeFigureOut">
               <a:rPr lang="zh-CN" altLang="en-US" smtClean="0"/>
-              <a:t>2019/4/11</a:t>
+              <a:t>2019/4/13</a:t>
             </a:fld>
             <a:endParaRPr lang="zh-CN" altLang="en-US"/>
           </a:p>
@@ -3778,7 +3778,7 @@
         <p:spPr>
           <a:xfrm>
             <a:off x="-3416653" y="1002133"/>
-            <a:ext cx="0" cy="2597583"/>
+            <a:ext cx="0" cy="7549357"/>
           </a:xfrm>
           <a:prstGeom prst="line">
             <a:avLst/>
@@ -3876,7 +3876,7 @@
         <p:spPr>
           <a:xfrm>
             <a:off x="-1632913" y="1005818"/>
-            <a:ext cx="0" cy="1695374"/>
+            <a:ext cx="0" cy="5159486"/>
           </a:xfrm>
           <a:prstGeom prst="line">
             <a:avLst/>
@@ -4360,14 +4360,13 @@
           <p:cNvCxnSpPr>
             <a:cxnSpLocks/>
             <a:stCxn id="21" idx="2"/>
-            <a:endCxn id="161" idx="0"/>
           </p:cNvCxnSpPr>
           <p:nvPr/>
         </p:nvCxnSpPr>
         <p:spPr>
           <a:xfrm>
             <a:off x="10393452" y="1101825"/>
-            <a:ext cx="19354" cy="5854908"/>
+            <a:ext cx="19354" cy="6359623"/>
           </a:xfrm>
           <a:prstGeom prst="line">
             <a:avLst/>
@@ -4455,8 +4454,8 @@
         </p:nvSpPr>
         <p:spPr>
           <a:xfrm>
-            <a:off x="-1223507" y="1879432"/>
-            <a:ext cx="1042552" cy="184666"/>
+            <a:off x="-1332541" y="1879534"/>
+            <a:ext cx="1155068" cy="184666"/>
           </a:xfrm>
           <a:prstGeom prst="rect">
             <a:avLst/>
@@ -4482,7 +4481,7 @@
           <a:p>
             <a:r>
               <a:rPr lang="en-US" sz="1200" dirty="0"/>
-              <a:t>parse(argument)</a:t>
+              <a:t>parse(“-cat food”)</a:t>
             </a:r>
           </a:p>
         </p:txBody>
@@ -4501,8 +4500,8 @@
         </p:nvSpPr>
         <p:spPr>
           <a:xfrm>
-            <a:off x="-3366358" y="1008916"/>
-            <a:ext cx="1391716" cy="430887"/>
+            <a:off x="-3318583" y="1065940"/>
+            <a:ext cx="1596513" cy="430887"/>
           </a:xfrm>
           <a:prstGeom prst="rect">
             <a:avLst/>
@@ -4526,6 +4525,7 @@
             </a:lvl1pPr>
           </a:lstStyle>
           <a:p>
+            <a:pPr algn="ctr"/>
             <a:r>
               <a:rPr lang="en-US" dirty="0" err="1"/>
               <a:t>parseCommand</a:t>
@@ -4533,17 +4533,10 @@
             <a:endParaRPr lang="en-US" dirty="0"/>
           </a:p>
           <a:p>
+            <a:pPr algn="ctr"/>
             <a:r>
               <a:rPr lang="en-US" dirty="0"/>
-              <a:t>(</a:t>
-            </a:r>
-            <a:r>
-              <a:rPr lang="en-US" dirty="0" err="1"/>
-              <a:t>commandText</a:t>
-            </a:r>
-            <a:r>
-              <a:rPr lang="en-US" dirty="0"/>
-              <a:t>)</a:t>
+              <a:t>(“search –cat food”)</a:t>
             </a:r>
           </a:p>
         </p:txBody>
@@ -6000,52 +5993,6 @@
           </a:effectRef>
           <a:fontRef idx="minor">
             <a:schemeClr val="tx1"/>
-          </a:fontRef>
-        </p:style>
-      </p:cxnSp>
-      <p:cxnSp>
-        <p:nvCxnSpPr>
-          <p:cNvPr id="116" name="Straight Connector 45">
-            <a:extLst>
-              <a:ext uri="{FF2B5EF4-FFF2-40B4-BE49-F238E27FC236}">
-                <a16:creationId xmlns:a16="http://schemas.microsoft.com/office/drawing/2014/main" id="{F157004D-9F74-4B6B-8F6E-01B0F9BB7130}"/>
-              </a:ext>
-            </a:extLst>
-          </p:cNvPr>
-          <p:cNvCxnSpPr>
-            <a:cxnSpLocks/>
-            <a:stCxn id="53" idx="2"/>
-          </p:cNvCxnSpPr>
-          <p:nvPr/>
-        </p:nvCxnSpPr>
-        <p:spPr>
-          <a:xfrm flipH="1">
-            <a:off x="2208804" y="5356735"/>
-            <a:ext cx="1842" cy="2895061"/>
-          </a:xfrm>
-          <a:prstGeom prst="line">
-            <a:avLst/>
-          </a:prstGeom>
-          <a:ln w="19050">
-            <a:solidFill>
-              <a:srgbClr val="0070C0"/>
-            </a:solidFill>
-            <a:prstDash val="sysDash"/>
-          </a:ln>
-          <a:effectLst/>
-        </p:spPr>
-        <p:style>
-          <a:lnRef idx="1">
-            <a:schemeClr val="accent1"/>
-          </a:lnRef>
-          <a:fillRef idx="2">
-            <a:schemeClr val="accent1"/>
-          </a:fillRef>
-          <a:effectRef idx="1">
-            <a:schemeClr val="accent1"/>
-          </a:effectRef>
-          <a:fontRef idx="minor">
-            <a:schemeClr val="dk1"/>
           </a:fontRef>
         </p:style>
       </p:cxnSp>
@@ -7468,6 +7415,277 @@
                 </a:solidFill>
               </a:rPr>
               <a:t>&lt;Record&gt;</a:t>
+            </a:r>
+          </a:p>
+        </p:txBody>
+      </p:sp>
+      <p:cxnSp>
+        <p:nvCxnSpPr>
+          <p:cNvPr id="82" name="Straight Connector 45">
+            <a:extLst>
+              <a:ext uri="{FF2B5EF4-FFF2-40B4-BE49-F238E27FC236}">
+                <a16:creationId xmlns:a16="http://schemas.microsoft.com/office/drawing/2014/main" id="{2101585D-7A83-4D89-A7B8-FDF60FA5F192}"/>
+              </a:ext>
+            </a:extLst>
+          </p:cNvPr>
+          <p:cNvCxnSpPr>
+            <a:cxnSpLocks/>
+          </p:cNvCxnSpPr>
+          <p:nvPr/>
+        </p:nvCxnSpPr>
+        <p:spPr>
+          <a:xfrm flipH="1">
+            <a:off x="2208804" y="5356735"/>
+            <a:ext cx="1842" cy="2895061"/>
+          </a:xfrm>
+          <a:prstGeom prst="line">
+            <a:avLst/>
+          </a:prstGeom>
+          <a:ln w="19050">
+            <a:solidFill>
+              <a:srgbClr val="0070C0"/>
+            </a:solidFill>
+            <a:prstDash val="sysDash"/>
+          </a:ln>
+          <a:effectLst/>
+        </p:spPr>
+        <p:style>
+          <a:lnRef idx="1">
+            <a:schemeClr val="accent1"/>
+          </a:lnRef>
+          <a:fillRef idx="2">
+            <a:schemeClr val="accent1"/>
+          </a:fillRef>
+          <a:effectRef idx="1">
+            <a:schemeClr val="accent1"/>
+          </a:effectRef>
+          <a:fontRef idx="minor">
+            <a:schemeClr val="dk1"/>
+          </a:fontRef>
+        </p:style>
+      </p:cxnSp>
+      <p:cxnSp>
+        <p:nvCxnSpPr>
+          <p:cNvPr id="83" name="Straight Connector 45">
+            <a:extLst>
+              <a:ext uri="{FF2B5EF4-FFF2-40B4-BE49-F238E27FC236}">
+                <a16:creationId xmlns:a16="http://schemas.microsoft.com/office/drawing/2014/main" id="{C0D6EE92-7D90-4A78-AF74-0808DEF31CA3}"/>
+              </a:ext>
+            </a:extLst>
+          </p:cNvPr>
+          <p:cNvCxnSpPr>
+            <a:cxnSpLocks/>
+          </p:cNvCxnSpPr>
+          <p:nvPr/>
+        </p:nvCxnSpPr>
+        <p:spPr>
+          <a:xfrm>
+            <a:off x="3046804" y="7815557"/>
+            <a:ext cx="0" cy="433223"/>
+          </a:xfrm>
+          <a:prstGeom prst="line">
+            <a:avLst/>
+          </a:prstGeom>
+          <a:ln w="19050">
+            <a:solidFill>
+              <a:srgbClr val="0070C0"/>
+            </a:solidFill>
+            <a:prstDash val="sysDash"/>
+          </a:ln>
+          <a:effectLst/>
+        </p:spPr>
+        <p:style>
+          <a:lnRef idx="1">
+            <a:schemeClr val="accent1"/>
+          </a:lnRef>
+          <a:fillRef idx="2">
+            <a:schemeClr val="accent1"/>
+          </a:fillRef>
+          <a:effectRef idx="1">
+            <a:schemeClr val="accent1"/>
+          </a:effectRef>
+          <a:fontRef idx="minor">
+            <a:schemeClr val="dk1"/>
+          </a:fontRef>
+        </p:style>
+      </p:cxnSp>
+      <p:cxnSp>
+        <p:nvCxnSpPr>
+          <p:cNvPr id="85" name="Straight Connector 70">
+            <a:extLst>
+              <a:ext uri="{FF2B5EF4-FFF2-40B4-BE49-F238E27FC236}">
+                <a16:creationId xmlns:a16="http://schemas.microsoft.com/office/drawing/2014/main" id="{E008D4CD-590D-44CD-94CC-7A752B69A2D4}"/>
+              </a:ext>
+            </a:extLst>
+          </p:cNvPr>
+          <p:cNvCxnSpPr>
+            <a:cxnSpLocks/>
+          </p:cNvCxnSpPr>
+          <p:nvPr/>
+        </p:nvCxnSpPr>
+        <p:spPr>
+          <a:xfrm>
+            <a:off x="4952386" y="2650801"/>
+            <a:ext cx="0" cy="284056"/>
+          </a:xfrm>
+          <a:prstGeom prst="line">
+            <a:avLst/>
+          </a:prstGeom>
+          <a:ln w="19050">
+            <a:solidFill>
+              <a:srgbClr val="7030A0"/>
+            </a:solidFill>
+            <a:prstDash val="sysDash"/>
+          </a:ln>
+          <a:effectLst/>
+        </p:spPr>
+        <p:style>
+          <a:lnRef idx="1">
+            <a:schemeClr val="accent1"/>
+          </a:lnRef>
+          <a:fillRef idx="2">
+            <a:schemeClr val="accent1"/>
+          </a:fillRef>
+          <a:effectRef idx="1">
+            <a:schemeClr val="accent1"/>
+          </a:effectRef>
+          <a:fontRef idx="minor">
+            <a:schemeClr val="dk1"/>
+          </a:fontRef>
+        </p:style>
+      </p:cxnSp>
+      <p:cxnSp>
+        <p:nvCxnSpPr>
+          <p:cNvPr id="89" name="Straight Connector 70">
+            <a:extLst>
+              <a:ext uri="{FF2B5EF4-FFF2-40B4-BE49-F238E27FC236}">
+                <a16:creationId xmlns:a16="http://schemas.microsoft.com/office/drawing/2014/main" id="{22B80AA5-7DC8-4260-BAAB-615C2734BB98}"/>
+              </a:ext>
+            </a:extLst>
+          </p:cNvPr>
+          <p:cNvCxnSpPr>
+            <a:cxnSpLocks/>
+          </p:cNvCxnSpPr>
+          <p:nvPr/>
+        </p:nvCxnSpPr>
+        <p:spPr>
+          <a:xfrm>
+            <a:off x="6832431" y="3555892"/>
+            <a:ext cx="0" cy="284056"/>
+          </a:xfrm>
+          <a:prstGeom prst="line">
+            <a:avLst/>
+          </a:prstGeom>
+          <a:ln w="19050">
+            <a:solidFill>
+              <a:srgbClr val="7030A0"/>
+            </a:solidFill>
+            <a:prstDash val="sysDash"/>
+          </a:ln>
+          <a:effectLst/>
+        </p:spPr>
+        <p:style>
+          <a:lnRef idx="1">
+            <a:schemeClr val="accent1"/>
+          </a:lnRef>
+          <a:fillRef idx="2">
+            <a:schemeClr val="accent1"/>
+          </a:fillRef>
+          <a:effectRef idx="1">
+            <a:schemeClr val="accent1"/>
+          </a:effectRef>
+          <a:fontRef idx="minor">
+            <a:schemeClr val="dk1"/>
+          </a:fontRef>
+        </p:style>
+      </p:cxnSp>
+      <p:cxnSp>
+        <p:nvCxnSpPr>
+          <p:cNvPr id="90" name="Straight Connector 70">
+            <a:extLst>
+              <a:ext uri="{FF2B5EF4-FFF2-40B4-BE49-F238E27FC236}">
+                <a16:creationId xmlns:a16="http://schemas.microsoft.com/office/drawing/2014/main" id="{5BE85B36-0F3B-41A9-AF15-255A4E9A1F2D}"/>
+              </a:ext>
+            </a:extLst>
+          </p:cNvPr>
+          <p:cNvCxnSpPr>
+            <a:cxnSpLocks/>
+          </p:cNvCxnSpPr>
+          <p:nvPr/>
+        </p:nvCxnSpPr>
+        <p:spPr>
+          <a:xfrm>
+            <a:off x="8827914" y="4354045"/>
+            <a:ext cx="0" cy="284056"/>
+          </a:xfrm>
+          <a:prstGeom prst="line">
+            <a:avLst/>
+          </a:prstGeom>
+          <a:ln w="19050">
+            <a:solidFill>
+              <a:srgbClr val="7030A0"/>
+            </a:solidFill>
+            <a:prstDash val="sysDash"/>
+          </a:ln>
+          <a:effectLst/>
+        </p:spPr>
+        <p:style>
+          <a:lnRef idx="1">
+            <a:schemeClr val="accent1"/>
+          </a:lnRef>
+          <a:fillRef idx="2">
+            <a:schemeClr val="accent1"/>
+          </a:fillRef>
+          <a:effectRef idx="1">
+            <a:schemeClr val="accent1"/>
+          </a:effectRef>
+          <a:fontRef idx="minor">
+            <a:schemeClr val="dk1"/>
+          </a:fontRef>
+        </p:style>
+      </p:cxnSp>
+      <p:sp>
+        <p:nvSpPr>
+          <p:cNvPr id="84" name="TextBox 81">
+            <a:extLst>
+              <a:ext uri="{FF2B5EF4-FFF2-40B4-BE49-F238E27FC236}">
+                <a16:creationId xmlns:a16="http://schemas.microsoft.com/office/drawing/2014/main" id="{02D89164-15FB-44C0-8AD2-83AEE13F8C2C}"/>
+              </a:ext>
+            </a:extLst>
+          </p:cNvPr>
+          <p:cNvSpPr txBox="1"/>
+          <p:nvPr/>
+        </p:nvSpPr>
+        <p:spPr>
+          <a:xfrm>
+            <a:off x="2245353" y="7778352"/>
+            <a:ext cx="621216" cy="215444"/>
+          </a:xfrm>
+          <a:prstGeom prst="rect">
+            <a:avLst/>
+          </a:prstGeom>
+          <a:noFill/>
+        </p:spPr>
+        <p:txBody>
+          <a:bodyPr wrap="square" lIns="0" tIns="0" rIns="0" bIns="0" rtlCol="0">
+            <a:spAutoFit/>
+          </a:bodyPr>
+          <a:lstStyle>
+            <a:defPPr>
+              <a:defRPr lang="en-US"/>
+            </a:defPPr>
+            <a:lvl1pPr algn="r">
+              <a:defRPr sz="1400">
+                <a:solidFill>
+                  <a:srgbClr val="0070C0"/>
+                </a:solidFill>
+              </a:defRPr>
+            </a:lvl1pPr>
+          </a:lstStyle>
+          <a:p>
+            <a:r>
+              <a:rPr lang="en-US" dirty="0"/>
+              <a:t>result</a:t>
             </a:r>
           </a:p>
         </p:txBody>

</xml_diff>